<commit_message>
Capitolo di AS-IS finito. Yuppi
</commit_message>
<xml_diff>
--- a/LRC.pptx
+++ b/LRC.pptx
@@ -104,6 +104,11 @@
       </a:defRPr>
     </a:lvl9pPr>
   </p:defaultTextStyle>
+  <p:extLst>
+    <p:ext uri="{EFAFB233-063F-42B5-8137-9DF3F51BA10A}">
+      <p15:sldGuideLst xmlns:p15="http://schemas.microsoft.com/office/powerpoint/2012/main"/>
+    </p:ext>
+  </p:extLst>
 </p:presentation>
 </file>
 
@@ -3340,7 +3345,7 @@
           <p:nvPr>
             <p:extLst>
               <p:ext uri="{D42A27DB-BD31-4B8C-83A1-F6EECF244321}">
-                <p14:modId xmlns:p14="http://schemas.microsoft.com/office/powerpoint/2010/main" val="3449224513"/>
+                <p14:modId xmlns:p14="http://schemas.microsoft.com/office/powerpoint/2010/main" val="2649819051"/>
               </p:ext>
             </p:extLst>
           </p:nvPr>
@@ -4000,7 +4005,10 @@
                     <a:bodyPr/>
                     <a:lstStyle/>
                     <a:p>
-                      <a:endParaRPr lang="it-IT"/>
+                      <a:r>
+                        <a:rPr lang="it-IT" dirty="0"/>
+                        <a:t>P</a:t>
+                      </a:r>
                     </a:p>
                   </a:txBody>
                   <a:tcPr/>

</xml_diff>